<commit_message>
Changed wireframe to allow for edit of questions
</commit_message>
<xml_diff>
--- a/Design Specification Final.pptx
+++ b/Design Specification Final.pptx
@@ -124,6 +124,51 @@
     </p:ext>
   </p:extLst>
 </p:presentation>
+</file>
+
+<file path=ppt/revisionInfo.xml><?xml version="1.0" encoding="utf-8"?>
+<p1510:revInfo xmlns:a="http://schemas.openxmlformats.org/drawingml/2006/main" xmlns:r="http://schemas.openxmlformats.org/officeDocument/2006/relationships" xmlns:p1510="http://schemas.microsoft.com/office/powerpoint/2015/10/main">
+  <p1510:revLst>
+    <p1510:client id="{F6AAB639-16AE-48AB-8659-1B76B719E1C8}" v="1" dt="2019-02-21T15:43:03.091"/>
+  </p1510:revLst>
+</p1510:revInfo>
+</file>
+
+<file path=ppt/changesInfos/changesInfo1.xml><?xml version="1.0" encoding="utf-8"?>
+<pc:chgInfo xmlns:a="http://schemas.openxmlformats.org/drawingml/2006/main" xmlns:r="http://schemas.openxmlformats.org/officeDocument/2006/relationships" xmlns:ac="http://schemas.microsoft.com/office/drawing/2013/main/command" xmlns:pc="http://schemas.microsoft.com/office/powerpoint/2013/main/command">
+  <pc:docChgLst>
+    <pc:chgData name="Euan Ferguson" userId="d3d78bc380f84dea" providerId="LiveId" clId="{F6AAB639-16AE-48AB-8659-1B76B719E1C8}"/>
+    <pc:docChg chg="custSel modSld">
+      <pc:chgData name="Euan Ferguson" userId="d3d78bc380f84dea" providerId="LiveId" clId="{F6AAB639-16AE-48AB-8659-1B76B719E1C8}" dt="2019-02-21T15:43:13.771" v="2" actId="1076"/>
+      <pc:docMkLst>
+        <pc:docMk/>
+      </pc:docMkLst>
+      <pc:sldChg chg="addSp delSp modSp">
+        <pc:chgData name="Euan Ferguson" userId="d3d78bc380f84dea" providerId="LiveId" clId="{F6AAB639-16AE-48AB-8659-1B76B719E1C8}" dt="2019-02-21T15:43:13.771" v="2" actId="1076"/>
+        <pc:sldMkLst>
+          <pc:docMk/>
+          <pc:sldMk cId="3628571314" sldId="269"/>
+        </pc:sldMkLst>
+        <pc:picChg chg="add mod">
+          <ac:chgData name="Euan Ferguson" userId="d3d78bc380f84dea" providerId="LiveId" clId="{F6AAB639-16AE-48AB-8659-1B76B719E1C8}" dt="2019-02-21T15:43:13.771" v="2" actId="1076"/>
+          <ac:picMkLst>
+            <pc:docMk/>
+            <pc:sldMk cId="3628571314" sldId="269"/>
+            <ac:picMk id="2" creationId="{34788158-4614-4B88-8C88-FE9462B6BDC3}"/>
+          </ac:picMkLst>
+        </pc:picChg>
+        <pc:picChg chg="del">
+          <ac:chgData name="Euan Ferguson" userId="d3d78bc380f84dea" providerId="LiveId" clId="{F6AAB639-16AE-48AB-8659-1B76B719E1C8}" dt="2019-02-21T15:43:01.937" v="0" actId="478"/>
+          <ac:picMkLst>
+            <pc:docMk/>
+            <pc:sldMk cId="3628571314" sldId="269"/>
+            <ac:picMk id="4" creationId="{6DB52C5B-1B6D-544F-995C-3E7CE8CDE30F}"/>
+          </ac:picMkLst>
+        </pc:picChg>
+      </pc:sldChg>
+    </pc:docChg>
+  </pc:docChgLst>
+</pc:chgInfo>
 </file>
 
 <file path=ppt/slideLayouts/slideLayout1.xml><?xml version="1.0" encoding="utf-8"?>
@@ -3590,10 +3635,10 @@
       </p:sp>
       <p:pic>
         <p:nvPicPr>
-          <p:cNvPr id="4" name="Picture 3" descr="A screenshot of a cell phone&#13;&#10;&#13;&#10;Description automatically generated">
-            <a:extLst>
-              <a:ext uri="{FF2B5EF4-FFF2-40B4-BE49-F238E27FC236}">
-                <a16:creationId xmlns:a16="http://schemas.microsoft.com/office/drawing/2014/main" id="{6DB52C5B-1B6D-544F-995C-3E7CE8CDE30F}"/>
+          <p:cNvPr id="2" name="Picture 1">
+            <a:extLst>
+              <a:ext uri="{FF2B5EF4-FFF2-40B4-BE49-F238E27FC236}">
+                <a16:creationId xmlns:a16="http://schemas.microsoft.com/office/drawing/2014/main" id="{34788158-4614-4B88-8C88-FE9462B6BDC3}"/>
               </a:ext>
             </a:extLst>
           </p:cNvPr>
@@ -3603,21 +3648,15 @@
           <p:nvPr/>
         </p:nvPicPr>
         <p:blipFill>
-          <a:blip r:embed="rId2">
-            <a:extLst>
-              <a:ext uri="{28A0092B-C50C-407E-A947-70E740481C1C}">
-                <a14:useLocalDpi xmlns:a14="http://schemas.microsoft.com/office/drawing/2010/main" val="0"/>
-              </a:ext>
-            </a:extLst>
-          </a:blip>
+          <a:blip r:embed="rId2"/>
           <a:stretch>
             <a:fillRect/>
           </a:stretch>
         </p:blipFill>
         <p:spPr>
           <a:xfrm>
-            <a:off x="3447092" y="0"/>
-            <a:ext cx="8744908" cy="6858000"/>
+            <a:off x="3341914" y="0"/>
+            <a:ext cx="8850086" cy="6858000"/>
           </a:xfrm>
           <a:prstGeom prst="rect">
             <a:avLst/>
@@ -3739,7 +3778,7 @@
       </p:sp>
       <p:pic>
         <p:nvPicPr>
-          <p:cNvPr id="4" name="Picture 3" descr="A screenshot of a cell phone&#13;&#10;&#13;&#10;Description automatically generated">
+          <p:cNvPr id="4" name="Picture 3" descr="A screenshot of a cell phone&#10;&#10;Description automatically generated">
             <a:extLst>
               <a:ext uri="{FF2B5EF4-FFF2-40B4-BE49-F238E27FC236}">
                 <a16:creationId xmlns:a16="http://schemas.microsoft.com/office/drawing/2014/main" id="{82A30BDD-9803-0843-A31C-26C8D764252A}"/>
@@ -5610,7 +5649,7 @@
       </p:grpSpPr>
       <p:pic>
         <p:nvPicPr>
-          <p:cNvPr id="5" name="Picture 4" descr="A picture containing screenshot&#13;&#10;&#13;&#10;Description automatically generated">
+          <p:cNvPr id="5" name="Picture 4" descr="A picture containing screenshot&#10;&#10;Description automatically generated">
             <a:extLst>
               <a:ext uri="{FF2B5EF4-FFF2-40B4-BE49-F238E27FC236}">
                 <a16:creationId xmlns:a16="http://schemas.microsoft.com/office/drawing/2014/main" id="{797919E1-3380-CD43-BF43-3D1908EF47EB}"/>
@@ -9078,7 +9117,7 @@
       </p:sp>
       <p:pic>
         <p:nvPicPr>
-          <p:cNvPr id="3" name="Picture 2" descr="A screenshot of a cell phone&#13;&#10;&#13;&#10;Description automatically generated">
+          <p:cNvPr id="3" name="Picture 2" descr="A screenshot of a cell phone&#10;&#10;Description automatically generated">
             <a:extLst>
               <a:ext uri="{FF2B5EF4-FFF2-40B4-BE49-F238E27FC236}">
                 <a16:creationId xmlns:a16="http://schemas.microsoft.com/office/drawing/2014/main" id="{A98DF243-C162-F14A-B84B-5638B63EB691}"/>
@@ -9227,7 +9266,7 @@
       </p:sp>
       <p:pic>
         <p:nvPicPr>
-          <p:cNvPr id="5" name="Picture 4" descr="A screenshot of a cell phone&#13;&#10;&#13;&#10;Description automatically generated">
+          <p:cNvPr id="5" name="Picture 4" descr="A screenshot of a cell phone&#10;&#10;Description automatically generated">
             <a:extLst>
               <a:ext uri="{FF2B5EF4-FFF2-40B4-BE49-F238E27FC236}">
                 <a16:creationId xmlns:a16="http://schemas.microsoft.com/office/drawing/2014/main" id="{D597E1AA-8350-0F4D-8D9D-94AD90B29A5C}"/>
@@ -9376,7 +9415,7 @@
       </p:sp>
       <p:pic>
         <p:nvPicPr>
-          <p:cNvPr id="3" name="Picture 2" descr="A screenshot of a cell phone&#13;&#10;&#13;&#10;Description automatically generated">
+          <p:cNvPr id="3" name="Picture 2" descr="A screenshot of a cell phone&#10;&#10;Description automatically generated">
             <a:extLst>
               <a:ext uri="{FF2B5EF4-FFF2-40B4-BE49-F238E27FC236}">
                 <a16:creationId xmlns:a16="http://schemas.microsoft.com/office/drawing/2014/main" id="{A4BC033C-0581-014B-85C2-BED5FBF50646}"/>

</xml_diff>